<commit_message>
Adding machine learning example
</commit_message>
<xml_diff>
--- a/Machine Learning Teaching Example VLa.pptx
+++ b/Machine Learning Teaching Example VLa.pptx
@@ -9261,7 +9261,7 @@
           <p:nvPr>
             <p:extLst>
               <p:ext uri="{D42A27DB-BD31-4B8C-83A1-F6EECF244321}">
-                <p14:modId xmlns:p14="http://schemas.microsoft.com/office/powerpoint/2010/main" val="3370827102"/>
+                <p14:modId xmlns:p14="http://schemas.microsoft.com/office/powerpoint/2010/main" val="1796524872"/>
               </p:ext>
             </p:extLst>
           </p:nvPr>
@@ -10707,7 +10707,7 @@
         </p:nvSpPr>
         <p:spPr>
           <a:xfrm>
-            <a:off x="2323548" y="5099239"/>
+            <a:off x="2310570" y="5149616"/>
             <a:ext cx="1039417" cy="738664"/>
           </a:xfrm>
           <a:prstGeom prst="rect">
@@ -11893,7 +11893,7 @@
         </p:nvSpPr>
         <p:spPr>
           <a:xfrm>
-            <a:off x="2350366" y="5146283"/>
+            <a:off x="2350366" y="5090532"/>
             <a:ext cx="1116520" cy="707301"/>
           </a:xfrm>
           <a:prstGeom prst="rect">

</xml_diff>